<commit_message>
Compile DocFlow as Depend
</commit_message>
<xml_diff>
--- a/images/icon.pptx
+++ b/images/icon.pptx
@@ -261,7 +261,7 @@
           <a:p>
             <a:fld id="{1163A7E7-668D-4C7B-85A4-63E5DFE84590}" type="datetimeFigureOut">
               <a:rPr lang="zh-CN" altLang="en-US" smtClean="0"/>
-              <a:t>2024/11/26</a:t>
+              <a:t>2024/12/14</a:t>
             </a:fld>
             <a:endParaRPr lang="zh-CN" altLang="en-US"/>
           </a:p>
@@ -461,7 +461,7 @@
           <a:p>
             <a:fld id="{1163A7E7-668D-4C7B-85A4-63E5DFE84590}" type="datetimeFigureOut">
               <a:rPr lang="zh-CN" altLang="en-US" smtClean="0"/>
-              <a:t>2024/11/26</a:t>
+              <a:t>2024/12/14</a:t>
             </a:fld>
             <a:endParaRPr lang="zh-CN" altLang="en-US"/>
           </a:p>
@@ -671,7 +671,7 @@
           <a:p>
             <a:fld id="{1163A7E7-668D-4C7B-85A4-63E5DFE84590}" type="datetimeFigureOut">
               <a:rPr lang="zh-CN" altLang="en-US" smtClean="0"/>
-              <a:t>2024/11/26</a:t>
+              <a:t>2024/12/14</a:t>
             </a:fld>
             <a:endParaRPr lang="zh-CN" altLang="en-US"/>
           </a:p>
@@ -871,7 +871,7 @@
           <a:p>
             <a:fld id="{1163A7E7-668D-4C7B-85A4-63E5DFE84590}" type="datetimeFigureOut">
               <a:rPr lang="zh-CN" altLang="en-US" smtClean="0"/>
-              <a:t>2024/11/26</a:t>
+              <a:t>2024/12/14</a:t>
             </a:fld>
             <a:endParaRPr lang="zh-CN" altLang="en-US"/>
           </a:p>
@@ -1147,7 +1147,7 @@
           <a:p>
             <a:fld id="{1163A7E7-668D-4C7B-85A4-63E5DFE84590}" type="datetimeFigureOut">
               <a:rPr lang="zh-CN" altLang="en-US" smtClean="0"/>
-              <a:t>2024/11/26</a:t>
+              <a:t>2024/12/14</a:t>
             </a:fld>
             <a:endParaRPr lang="zh-CN" altLang="en-US"/>
           </a:p>
@@ -1415,7 +1415,7 @@
           <a:p>
             <a:fld id="{1163A7E7-668D-4C7B-85A4-63E5DFE84590}" type="datetimeFigureOut">
               <a:rPr lang="zh-CN" altLang="en-US" smtClean="0"/>
-              <a:t>2024/11/26</a:t>
+              <a:t>2024/12/14</a:t>
             </a:fld>
             <a:endParaRPr lang="zh-CN" altLang="en-US"/>
           </a:p>
@@ -1830,7 +1830,7 @@
           <a:p>
             <a:fld id="{1163A7E7-668D-4C7B-85A4-63E5DFE84590}" type="datetimeFigureOut">
               <a:rPr lang="zh-CN" altLang="en-US" smtClean="0"/>
-              <a:t>2024/11/26</a:t>
+              <a:t>2024/12/14</a:t>
             </a:fld>
             <a:endParaRPr lang="zh-CN" altLang="en-US"/>
           </a:p>
@@ -1972,7 +1972,7 @@
           <a:p>
             <a:fld id="{1163A7E7-668D-4C7B-85A4-63E5DFE84590}" type="datetimeFigureOut">
               <a:rPr lang="zh-CN" altLang="en-US" smtClean="0"/>
-              <a:t>2024/11/26</a:t>
+              <a:t>2024/12/14</a:t>
             </a:fld>
             <a:endParaRPr lang="zh-CN" altLang="en-US"/>
           </a:p>
@@ -2085,7 +2085,7 @@
           <a:p>
             <a:fld id="{1163A7E7-668D-4C7B-85A4-63E5DFE84590}" type="datetimeFigureOut">
               <a:rPr lang="zh-CN" altLang="en-US" smtClean="0"/>
-              <a:t>2024/11/26</a:t>
+              <a:t>2024/12/14</a:t>
             </a:fld>
             <a:endParaRPr lang="zh-CN" altLang="en-US"/>
           </a:p>
@@ -2398,7 +2398,7 @@
           <a:p>
             <a:fld id="{1163A7E7-668D-4C7B-85A4-63E5DFE84590}" type="datetimeFigureOut">
               <a:rPr lang="zh-CN" altLang="en-US" smtClean="0"/>
-              <a:t>2024/11/26</a:t>
+              <a:t>2024/12/14</a:t>
             </a:fld>
             <a:endParaRPr lang="zh-CN" altLang="en-US"/>
           </a:p>
@@ -2687,7 +2687,7 @@
           <a:p>
             <a:fld id="{1163A7E7-668D-4C7B-85A4-63E5DFE84590}" type="datetimeFigureOut">
               <a:rPr lang="zh-CN" altLang="en-US" smtClean="0"/>
-              <a:t>2024/11/26</a:t>
+              <a:t>2024/12/14</a:t>
             </a:fld>
             <a:endParaRPr lang="zh-CN" altLang="en-US"/>
           </a:p>
@@ -2930,7 +2930,7 @@
           <a:p>
             <a:fld id="{1163A7E7-668D-4C7B-85A4-63E5DFE84590}" type="datetimeFigureOut">
               <a:rPr lang="zh-CN" altLang="en-US" smtClean="0"/>
-              <a:t>2024/11/26</a:t>
+              <a:t>2024/12/14</a:t>
             </a:fld>
             <a:endParaRPr lang="zh-CN" altLang="en-US"/>
           </a:p>
@@ -4109,6 +4109,370 @@
           </p:txBody>
         </p:sp>
       </p:grpSp>
+      <p:grpSp>
+        <p:nvGrpSpPr>
+          <p:cNvPr id="2" name="Group 1">
+            <a:extLst>
+              <a:ext uri="{FF2B5EF4-FFF2-40B4-BE49-F238E27FC236}">
+                <a16:creationId xmlns:a16="http://schemas.microsoft.com/office/drawing/2014/main" id="{965F5F23-E3D5-1EE5-4AFE-A75D92ED1BD2}"/>
+              </a:ext>
+            </a:extLst>
+          </p:cNvPr>
+          <p:cNvGrpSpPr/>
+          <p:nvPr/>
+        </p:nvGrpSpPr>
+        <p:grpSpPr>
+          <a:xfrm>
+            <a:off x="2038209" y="896603"/>
+            <a:ext cx="2324943" cy="1422421"/>
+            <a:chOff x="2949574" y="1778028"/>
+            <a:chExt cx="2324943" cy="1422421"/>
+          </a:xfrm>
+        </p:grpSpPr>
+        <p:grpSp>
+          <p:nvGrpSpPr>
+            <p:cNvPr id="3" name="Group 2">
+              <a:extLst>
+                <a:ext uri="{FF2B5EF4-FFF2-40B4-BE49-F238E27FC236}">
+                  <a16:creationId xmlns:a16="http://schemas.microsoft.com/office/drawing/2014/main" id="{60611C3E-F63A-31CF-5043-C9646A295DA0}"/>
+                </a:ext>
+              </a:extLst>
+            </p:cNvPr>
+            <p:cNvGrpSpPr/>
+            <p:nvPr/>
+          </p:nvGrpSpPr>
+          <p:grpSpPr>
+            <a:xfrm>
+              <a:off x="4102100" y="2143382"/>
+              <a:ext cx="813901" cy="574658"/>
+              <a:chOff x="6014722" y="1737858"/>
+              <a:chExt cx="632994" cy="446928"/>
+            </a:xfrm>
+          </p:grpSpPr>
+          <p:pic>
+            <p:nvPicPr>
+              <p:cNvPr id="26" name="Picture 25">
+                <a:extLst>
+                  <a:ext uri="{FF2B5EF4-FFF2-40B4-BE49-F238E27FC236}">
+                    <a16:creationId xmlns:a16="http://schemas.microsoft.com/office/drawing/2014/main" id="{B3820327-D8A8-B8B1-C88F-121C69CFAF6E}"/>
+                  </a:ext>
+                </a:extLst>
+              </p:cNvPr>
+              <p:cNvPicPr>
+                <a:picLocks noChangeAspect="1"/>
+              </p:cNvPicPr>
+              <p:nvPr/>
+            </p:nvPicPr>
+            <p:blipFill>
+              <a:blip r:embed="rId2">
+                <a:duotone>
+                  <a:schemeClr val="accent4">
+                    <a:shade val="45000"/>
+                    <a:satMod val="135000"/>
+                  </a:schemeClr>
+                  <a:prstClr val="white"/>
+                </a:duotone>
+                <a:alphaModFix amt="85000"/>
+                <a:extLst>
+                  <a:ext uri="{BEBA8EAE-BF5A-486C-A8C5-ECC9F3942E4B}">
+                    <a14:imgProps xmlns:a14="http://schemas.microsoft.com/office/drawing/2010/main">
+                      <a14:imgLayer r:embed="rId3">
+                        <a14:imgEffect>
+                          <a14:colorTemperature colorTemp="11200"/>
+                        </a14:imgEffect>
+                        <a14:imgEffect>
+                          <a14:brightnessContrast bright="40000" contrast="20000"/>
+                        </a14:imgEffect>
+                      </a14:imgLayer>
+                    </a14:imgProps>
+                  </a:ext>
+                </a:extLst>
+              </a:blip>
+              <a:srcRect l="24537" t="1" b="28309"/>
+              <a:stretch/>
+            </p:blipFill>
+            <p:spPr>
+              <a:xfrm>
+                <a:off x="6177279" y="1737859"/>
+                <a:ext cx="470437" cy="446927"/>
+              </a:xfrm>
+              <a:prstGeom prst="rect">
+                <a:avLst/>
+              </a:prstGeom>
+              <a:noFill/>
+              <a:ln>
+                <a:noFill/>
+              </a:ln>
+            </p:spPr>
+          </p:pic>
+          <p:pic>
+            <p:nvPicPr>
+              <p:cNvPr id="27" name="Picture 26">
+                <a:extLst>
+                  <a:ext uri="{FF2B5EF4-FFF2-40B4-BE49-F238E27FC236}">
+                    <a16:creationId xmlns:a16="http://schemas.microsoft.com/office/drawing/2014/main" id="{8553E87C-225B-D040-5E60-FE7B48EDB550}"/>
+                  </a:ext>
+                </a:extLst>
+              </p:cNvPr>
+              <p:cNvPicPr>
+                <a:picLocks noChangeAspect="1"/>
+              </p:cNvPicPr>
+              <p:nvPr/>
+            </p:nvPicPr>
+            <p:blipFill>
+              <a:blip r:embed="rId2">
+                <a:duotone>
+                  <a:schemeClr val="accent4">
+                    <a:shade val="45000"/>
+                    <a:satMod val="135000"/>
+                  </a:schemeClr>
+                  <a:prstClr val="white"/>
+                </a:duotone>
+                <a:alphaModFix amt="85000"/>
+                <a:extLst>
+                  <a:ext uri="{BEBA8EAE-BF5A-486C-A8C5-ECC9F3942E4B}">
+                    <a14:imgProps xmlns:a14="http://schemas.microsoft.com/office/drawing/2010/main">
+                      <a14:imgLayer r:embed="rId3">
+                        <a14:imgEffect>
+                          <a14:colorTemperature colorTemp="11200"/>
+                        </a14:imgEffect>
+                        <a14:imgEffect>
+                          <a14:brightnessContrast bright="40000" contrast="20000"/>
+                        </a14:imgEffect>
+                      </a14:imgLayer>
+                    </a14:imgProps>
+                  </a:ext>
+                </a:extLst>
+              </a:blip>
+              <a:srcRect l="-1537" t="1" r="15284" b="37878"/>
+              <a:stretch/>
+            </p:blipFill>
+            <p:spPr>
+              <a:xfrm>
+                <a:off x="6014722" y="1737858"/>
+                <a:ext cx="537703" cy="387275"/>
+              </a:xfrm>
+              <a:prstGeom prst="rect">
+                <a:avLst/>
+              </a:prstGeom>
+              <a:noFill/>
+              <a:ln>
+                <a:noFill/>
+              </a:ln>
+            </p:spPr>
+          </p:pic>
+        </p:grpSp>
+        <p:pic>
+          <p:nvPicPr>
+            <p:cNvPr id="4" name="Picture 3">
+              <a:extLst>
+                <a:ext uri="{FF2B5EF4-FFF2-40B4-BE49-F238E27FC236}">
+                  <a16:creationId xmlns:a16="http://schemas.microsoft.com/office/drawing/2014/main" id="{99DCFC38-9F85-BEEF-2E2D-0EC2F85A8D77}"/>
+                </a:ext>
+              </a:extLst>
+            </p:cNvPr>
+            <p:cNvPicPr>
+              <a:picLocks noChangeAspect="1"/>
+            </p:cNvPicPr>
+            <p:nvPr/>
+          </p:nvPicPr>
+          <p:blipFill>
+            <a:blip r:embed="rId4">
+              <a:extLst>
+                <a:ext uri="{BEBA8EAE-BF5A-486C-A8C5-ECC9F3942E4B}">
+                  <a14:imgProps xmlns:a14="http://schemas.microsoft.com/office/drawing/2010/main">
+                    <a14:imgLayer r:embed="rId5">
+                      <a14:imgEffect>
+                        <a14:colorTemperature colorTemp="4700"/>
+                      </a14:imgEffect>
+                    </a14:imgLayer>
+                  </a14:imgProps>
+                </a:ext>
+              </a:extLst>
+            </a:blip>
+            <a:srcRect t="76535" b="7291"/>
+            <a:stretch/>
+          </p:blipFill>
+          <p:spPr>
+            <a:xfrm>
+              <a:off x="3500000" y="2908393"/>
+              <a:ext cx="1606837" cy="259882"/>
+            </a:xfrm>
+            <a:prstGeom prst="rect">
+              <a:avLst/>
+            </a:prstGeom>
+          </p:spPr>
+        </p:pic>
+        <p:pic>
+          <p:nvPicPr>
+            <p:cNvPr id="5" name="Picture 4">
+              <a:extLst>
+                <a:ext uri="{FF2B5EF4-FFF2-40B4-BE49-F238E27FC236}">
+                  <a16:creationId xmlns:a16="http://schemas.microsoft.com/office/drawing/2014/main" id="{BD1CDD6B-9572-DA7B-79A3-062207250AB9}"/>
+                </a:ext>
+              </a:extLst>
+            </p:cNvPr>
+            <p:cNvPicPr>
+              <a:picLocks noChangeAspect="1"/>
+            </p:cNvPicPr>
+            <p:nvPr/>
+          </p:nvPicPr>
+          <p:blipFill>
+            <a:blip r:embed="rId4">
+              <a:extLst>
+                <a:ext uri="{BEBA8EAE-BF5A-486C-A8C5-ECC9F3942E4B}">
+                  <a14:imgProps xmlns:a14="http://schemas.microsoft.com/office/drawing/2010/main">
+                    <a14:imgLayer r:embed="rId5">
+                      <a14:imgEffect>
+                        <a14:colorTemperature colorTemp="4700"/>
+                      </a14:imgEffect>
+                    </a14:imgLayer>
+                  </a14:imgProps>
+                </a:ext>
+              </a:extLst>
+            </a:blip>
+            <a:srcRect l="80343" t="2" b="40568"/>
+            <a:stretch/>
+          </p:blipFill>
+          <p:spPr>
+            <a:xfrm>
+              <a:off x="4945589" y="1778715"/>
+              <a:ext cx="315845" cy="954960"/>
+            </a:xfrm>
+            <a:prstGeom prst="rect">
+              <a:avLst/>
+            </a:prstGeom>
+          </p:spPr>
+        </p:pic>
+        <p:pic>
+          <p:nvPicPr>
+            <p:cNvPr id="9" name="Picture 8">
+              <a:extLst>
+                <a:ext uri="{FF2B5EF4-FFF2-40B4-BE49-F238E27FC236}">
+                  <a16:creationId xmlns:a16="http://schemas.microsoft.com/office/drawing/2014/main" id="{5398AF76-6576-C15C-718F-05C6CEEDE885}"/>
+                </a:ext>
+              </a:extLst>
+            </p:cNvPr>
+            <p:cNvPicPr>
+              <a:picLocks noChangeAspect="1"/>
+            </p:cNvPicPr>
+            <p:nvPr/>
+          </p:nvPicPr>
+          <p:blipFill>
+            <a:blip r:embed="rId4">
+              <a:extLst>
+                <a:ext uri="{BEBA8EAE-BF5A-486C-A8C5-ECC9F3942E4B}">
+                  <a14:imgProps xmlns:a14="http://schemas.microsoft.com/office/drawing/2010/main">
+                    <a14:imgLayer r:embed="rId5">
+                      <a14:imgEffect>
+                        <a14:colorTemperature colorTemp="4700"/>
+                      </a14:imgEffect>
+                    </a14:imgLayer>
+                  </a14:imgProps>
+                </a:ext>
+              </a:extLst>
+            </a:blip>
+            <a:srcRect t="1" b="61642"/>
+            <a:stretch/>
+          </p:blipFill>
+          <p:spPr>
+            <a:xfrm>
+              <a:off x="3654597" y="1778028"/>
+              <a:ext cx="1606837" cy="616345"/>
+            </a:xfrm>
+            <a:prstGeom prst="rect">
+              <a:avLst/>
+            </a:prstGeom>
+          </p:spPr>
+        </p:pic>
+        <p:sp>
+          <p:nvSpPr>
+            <p:cNvPr id="11" name="TextBox 10">
+              <a:extLst>
+                <a:ext uri="{FF2B5EF4-FFF2-40B4-BE49-F238E27FC236}">
+                  <a16:creationId xmlns:a16="http://schemas.microsoft.com/office/drawing/2014/main" id="{D435D133-3C6E-88FE-5AD2-B85A1B0960C3}"/>
+                </a:ext>
+              </a:extLst>
+            </p:cNvPr>
+            <p:cNvSpPr txBox="1"/>
+            <p:nvPr/>
+          </p:nvSpPr>
+          <p:spPr>
+            <a:xfrm>
+              <a:off x="2949574" y="2184786"/>
+              <a:ext cx="2324943" cy="1015663"/>
+            </a:xfrm>
+            <a:prstGeom prst="rect">
+              <a:avLst/>
+            </a:prstGeom>
+            <a:noFill/>
+          </p:spPr>
+          <p:txBody>
+            <a:bodyPr wrap="square">
+              <a:spAutoFit/>
+            </a:bodyPr>
+            <a:lstStyle/>
+            <a:p>
+              <a:pPr algn="ctr"/>
+              <a:r>
+                <a:rPr lang="en-US" altLang="zh-CN" sz="6000" dirty="0">
+                  <a:solidFill>
+                    <a:srgbClr val="1B5FFF"/>
+                  </a:solidFill>
+                  <a:latin typeface="Magneto" panose="04030805050802020D02" pitchFamily="82" charset="0"/>
+                  <a:ea typeface="Cambria" panose="02040503050406030204" pitchFamily="18" charset="0"/>
+                </a:rPr>
+                <a:t>A</a:t>
+              </a:r>
+              <a:r>
+                <a:rPr lang="en-US" altLang="zh-CN" sz="2400" dirty="0">
+                  <a:solidFill>
+                    <a:srgbClr val="1B5FFF"/>
+                  </a:solidFill>
+                  <a:latin typeface="Magneto" panose="04030805050802020D02" pitchFamily="82" charset="0"/>
+                  <a:ea typeface="Cambria" panose="02040503050406030204" pitchFamily="18" charset="0"/>
+                </a:rPr>
+                <a:t>CCESS</a:t>
+              </a:r>
+              <a:endParaRPr lang="zh-CN" altLang="en-US" sz="3200" dirty="0">
+                <a:solidFill>
+                  <a:srgbClr val="1B5FFF"/>
+                </a:solidFill>
+                <a:latin typeface="Magneto" panose="04030805050802020D02" pitchFamily="82" charset="0"/>
+              </a:endParaRPr>
+            </a:p>
+          </p:txBody>
+        </p:sp>
+      </p:grpSp>
+      <p:pic>
+        <p:nvPicPr>
+          <p:cNvPr id="36" name="Picture 35">
+            <a:extLst>
+              <a:ext uri="{FF2B5EF4-FFF2-40B4-BE49-F238E27FC236}">
+                <a16:creationId xmlns:a16="http://schemas.microsoft.com/office/drawing/2014/main" id="{F3E94607-B332-52D0-923A-8308BC7F26DF}"/>
+              </a:ext>
+            </a:extLst>
+          </p:cNvPr>
+          <p:cNvPicPr>
+            <a:picLocks noChangeAspect="1"/>
+          </p:cNvPicPr>
+          <p:nvPr/>
+        </p:nvPicPr>
+        <p:blipFill>
+          <a:blip r:embed="rId6"/>
+          <a:srcRect l="11640" b="21216"/>
+          <a:stretch/>
+        </p:blipFill>
+        <p:spPr>
+          <a:xfrm>
+            <a:off x="5243652" y="581241"/>
+            <a:ext cx="2451022" cy="1445727"/>
+          </a:xfrm>
+          <a:prstGeom prst="rect">
+            <a:avLst/>
+          </a:prstGeom>
+        </p:spPr>
+      </p:pic>
     </p:spTree>
     <p:extLst>
       <p:ext uri="{BB962C8B-B14F-4D97-AF65-F5344CB8AC3E}">

</xml_diff>